<commit_message>
2024/03/06 after Phison interview commit
</commit_message>
<xml_diff>
--- a/IC design course/lab/question/HW4/file/report.pptx
+++ b/IC design course/lab/question/HW4/file/report.pptx
@@ -259,7 +259,7 @@
           <a:p>
             <a:fld id="{A69F8119-0397-4EC9-AD83-AD4695C5C00E}" type="datetimeFigureOut">
               <a:rPr lang="zh-TW" altLang="en-US" smtClean="0"/>
-              <a:t>2023/5/18</a:t>
+              <a:t>2024/3/1</a:t>
             </a:fld>
             <a:endParaRPr lang="zh-TW" altLang="en-US"/>
           </a:p>
@@ -457,7 +457,7 @@
           <a:p>
             <a:fld id="{A69F8119-0397-4EC9-AD83-AD4695C5C00E}" type="datetimeFigureOut">
               <a:rPr lang="zh-TW" altLang="en-US" smtClean="0"/>
-              <a:t>2023/5/18</a:t>
+              <a:t>2024/3/1</a:t>
             </a:fld>
             <a:endParaRPr lang="zh-TW" altLang="en-US"/>
           </a:p>
@@ -665,7 +665,7 @@
           <a:p>
             <a:fld id="{A69F8119-0397-4EC9-AD83-AD4695C5C00E}" type="datetimeFigureOut">
               <a:rPr lang="zh-TW" altLang="en-US" smtClean="0"/>
-              <a:t>2023/5/18</a:t>
+              <a:t>2024/3/1</a:t>
             </a:fld>
             <a:endParaRPr lang="zh-TW" altLang="en-US"/>
           </a:p>
@@ -863,7 +863,7 @@
           <a:p>
             <a:fld id="{A69F8119-0397-4EC9-AD83-AD4695C5C00E}" type="datetimeFigureOut">
               <a:rPr lang="zh-TW" altLang="en-US" smtClean="0"/>
-              <a:t>2023/5/18</a:t>
+              <a:t>2024/3/1</a:t>
             </a:fld>
             <a:endParaRPr lang="zh-TW" altLang="en-US"/>
           </a:p>
@@ -1138,7 +1138,7 @@
           <a:p>
             <a:fld id="{A69F8119-0397-4EC9-AD83-AD4695C5C00E}" type="datetimeFigureOut">
               <a:rPr lang="zh-TW" altLang="en-US" smtClean="0"/>
-              <a:t>2023/5/18</a:t>
+              <a:t>2024/3/1</a:t>
             </a:fld>
             <a:endParaRPr lang="zh-TW" altLang="en-US"/>
           </a:p>
@@ -1403,7 +1403,7 @@
           <a:p>
             <a:fld id="{A69F8119-0397-4EC9-AD83-AD4695C5C00E}" type="datetimeFigureOut">
               <a:rPr lang="zh-TW" altLang="en-US" smtClean="0"/>
-              <a:t>2023/5/18</a:t>
+              <a:t>2024/3/1</a:t>
             </a:fld>
             <a:endParaRPr lang="zh-TW" altLang="en-US"/>
           </a:p>
@@ -1815,7 +1815,7 @@
           <a:p>
             <a:fld id="{A69F8119-0397-4EC9-AD83-AD4695C5C00E}" type="datetimeFigureOut">
               <a:rPr lang="zh-TW" altLang="en-US" smtClean="0"/>
-              <a:t>2023/5/18</a:t>
+              <a:t>2024/3/1</a:t>
             </a:fld>
             <a:endParaRPr lang="zh-TW" altLang="en-US"/>
           </a:p>
@@ -1956,7 +1956,7 @@
           <a:p>
             <a:fld id="{A69F8119-0397-4EC9-AD83-AD4695C5C00E}" type="datetimeFigureOut">
               <a:rPr lang="zh-TW" altLang="en-US" smtClean="0"/>
-              <a:t>2023/5/18</a:t>
+              <a:t>2024/3/1</a:t>
             </a:fld>
             <a:endParaRPr lang="zh-TW" altLang="en-US"/>
           </a:p>
@@ -2069,7 +2069,7 @@
           <a:p>
             <a:fld id="{A69F8119-0397-4EC9-AD83-AD4695C5C00E}" type="datetimeFigureOut">
               <a:rPr lang="zh-TW" altLang="en-US" smtClean="0"/>
-              <a:t>2023/5/18</a:t>
+              <a:t>2024/3/1</a:t>
             </a:fld>
             <a:endParaRPr lang="zh-TW" altLang="en-US"/>
           </a:p>
@@ -2380,7 +2380,7 @@
           <a:p>
             <a:fld id="{A69F8119-0397-4EC9-AD83-AD4695C5C00E}" type="datetimeFigureOut">
               <a:rPr lang="zh-TW" altLang="en-US" smtClean="0"/>
-              <a:t>2023/5/18</a:t>
+              <a:t>2024/3/1</a:t>
             </a:fld>
             <a:endParaRPr lang="zh-TW" altLang="en-US"/>
           </a:p>
@@ -2668,7 +2668,7 @@
           <a:p>
             <a:fld id="{A69F8119-0397-4EC9-AD83-AD4695C5C00E}" type="datetimeFigureOut">
               <a:rPr lang="zh-TW" altLang="en-US" smtClean="0"/>
-              <a:t>2023/5/18</a:t>
+              <a:t>2024/3/1</a:t>
             </a:fld>
             <a:endParaRPr lang="zh-TW" altLang="en-US"/>
           </a:p>
@@ -2909,7 +2909,7 @@
           <a:p>
             <a:fld id="{A69F8119-0397-4EC9-AD83-AD4695C5C00E}" type="datetimeFigureOut">
               <a:rPr lang="zh-TW" altLang="en-US" smtClean="0"/>
-              <a:t>2023/5/18</a:t>
+              <a:t>2024/3/1</a:t>
             </a:fld>
             <a:endParaRPr lang="zh-TW" altLang="en-US"/>
           </a:p>
@@ -4189,7 +4189,7 @@
         </p:nvSpPr>
         <p:spPr>
           <a:xfrm>
-            <a:off x="747773" y="1981477"/>
+            <a:off x="910203" y="1943439"/>
             <a:ext cx="1428820" cy="735105"/>
           </a:xfrm>
           <a:prstGeom prst="ellipse">
@@ -4394,68 +4394,16 @@
           </p:cNvPr>
           <p:cNvCxnSpPr>
             <a:cxnSpLocks/>
-            <a:stCxn id="9" idx="2"/>
-            <a:endCxn id="11" idx="5"/>
           </p:cNvCxnSpPr>
           <p:nvPr/>
         </p:nvCxnSpPr>
         <p:spPr>
           <a:xfrm rot="10800000">
-            <a:off x="2618049" y="4016636"/>
+            <a:off x="2618048" y="4067756"/>
             <a:ext cx="785744" cy="421379"/>
           </a:xfrm>
           <a:prstGeom prst="curvedConnector2">
             <a:avLst/>
-          </a:prstGeom>
-          <a:ln w="28575" cap="flat" cmpd="sng" algn="ctr">
-            <a:solidFill>
-              <a:srgbClr val="7395D3"/>
-            </a:solidFill>
-            <a:prstDash val="solid"/>
-            <a:round/>
-            <a:headEnd type="none" w="med" len="med"/>
-            <a:tailEnd type="arrow" w="med" len="med"/>
-          </a:ln>
-        </p:spPr>
-        <p:style>
-          <a:lnRef idx="0">
-            <a:scrgbClr r="0" g="0" b="0"/>
-          </a:lnRef>
-          <a:fillRef idx="0">
-            <a:scrgbClr r="0" g="0" b="0"/>
-          </a:fillRef>
-          <a:effectRef idx="0">
-            <a:scrgbClr r="0" g="0" b="0"/>
-          </a:effectRef>
-          <a:fontRef idx="minor">
-            <a:schemeClr val="tx1"/>
-          </a:fontRef>
-        </p:style>
-      </p:cxnSp>
-      <p:cxnSp>
-        <p:nvCxnSpPr>
-          <p:cNvPr id="74" name="接點: 弧形 73">
-            <a:extLst>
-              <a:ext uri="{FF2B5EF4-FFF2-40B4-BE49-F238E27FC236}">
-                <a16:creationId xmlns:a16="http://schemas.microsoft.com/office/drawing/2014/main" id="{3B61A10A-331E-2E0A-A1E1-91CC18E234A9}"/>
-              </a:ext>
-            </a:extLst>
-          </p:cNvPr>
-          <p:cNvCxnSpPr>
-            <a:cxnSpLocks/>
-            <a:stCxn id="11" idx="0"/>
-          </p:cNvCxnSpPr>
-          <p:nvPr/>
-        </p:nvCxnSpPr>
-        <p:spPr>
-          <a:xfrm rot="16200000" flipV="1">
-            <a:off x="1451233" y="2727532"/>
-            <a:ext cx="672602" cy="650702"/>
-          </a:xfrm>
-          <a:prstGeom prst="curvedConnector3">
-            <a:avLst>
-              <a:gd name="adj1" fmla="val 50000"/>
-            </a:avLst>
           </a:prstGeom>
           <a:ln w="28575" cap="flat" cmpd="sng" algn="ctr">
             <a:solidFill>
@@ -4557,6 +4505,57 @@
           <a:prstGeom prst="curvedConnector3">
             <a:avLst>
               <a:gd name="adj1" fmla="val -49356"/>
+            </a:avLst>
+          </a:prstGeom>
+          <a:ln w="28575" cap="flat" cmpd="sng" algn="ctr">
+            <a:solidFill>
+              <a:srgbClr val="7395D3"/>
+            </a:solidFill>
+            <a:prstDash val="solid"/>
+            <a:round/>
+            <a:headEnd type="none" w="med" len="med"/>
+            <a:tailEnd type="arrow" w="med" len="med"/>
+          </a:ln>
+        </p:spPr>
+        <p:style>
+          <a:lnRef idx="0">
+            <a:scrgbClr r="0" g="0" b="0"/>
+          </a:lnRef>
+          <a:fillRef idx="0">
+            <a:scrgbClr r="0" g="0" b="0"/>
+          </a:fillRef>
+          <a:effectRef idx="0">
+            <a:scrgbClr r="0" g="0" b="0"/>
+          </a:effectRef>
+          <a:fontRef idx="minor">
+            <a:schemeClr val="tx1"/>
+          </a:fontRef>
+        </p:style>
+      </p:cxnSp>
+      <p:cxnSp>
+        <p:nvCxnSpPr>
+          <p:cNvPr id="26" name="接點: 弧形 25">
+            <a:extLst>
+              <a:ext uri="{FF2B5EF4-FFF2-40B4-BE49-F238E27FC236}">
+                <a16:creationId xmlns:a16="http://schemas.microsoft.com/office/drawing/2014/main" id="{0A61E1C0-06D0-4BA6-98CF-DB601D93E05F}"/>
+              </a:ext>
+            </a:extLst>
+          </p:cNvPr>
+          <p:cNvCxnSpPr>
+            <a:cxnSpLocks/>
+            <a:stCxn id="11" idx="0"/>
+            <a:endCxn id="12" idx="4"/>
+          </p:cNvCxnSpPr>
+          <p:nvPr/>
+        </p:nvCxnSpPr>
+        <p:spPr>
+          <a:xfrm rot="16200000" flipV="1">
+            <a:off x="1513429" y="2789728"/>
+            <a:ext cx="710640" cy="488272"/>
+          </a:xfrm>
+          <a:prstGeom prst="curvedConnector3">
+            <a:avLst>
+              <a:gd name="adj1" fmla="val 51249"/>
             </a:avLst>
           </a:prstGeom>
           <a:ln w="28575" cap="flat" cmpd="sng" algn="ctr">

</xml_diff>